<commit_message>
Test coe qui valide la mémoire. Ajout de constantes pour supprimer warning pcpi irq. MaJ journal de bord
</commit_message>
<xml_diff>
--- a/Documents/Reunions_projet/Presentation6.pptx
+++ b/Documents/Reunions_projet/Presentation6.pptx
@@ -7858,41 +7858,7 @@
             </a:pPr>
             <a:r>
               <a:rPr lang="fr-FR" sz="2000" dirty="0"/>
-              <a:t>15/01/24</a:t>
-            </a:r>
-          </a:p>
-          <a:p>
-            <a:pPr marL="0" indent="0">
-              <a:buNone/>
-            </a:pPr>
-            <a:r>
-              <a:rPr lang="fr-FR" sz="2000" dirty="0"/>
-              <a:t>- Installation de </a:t>
-            </a:r>
-            <a:r>
-              <a:rPr lang="fr-FR" sz="2000" dirty="0" err="1"/>
-              <a:t>Vivado</a:t>
-            </a:r>
-            <a:r>
-              <a:rPr lang="fr-FR" sz="2000" dirty="0"/>
-              <a:t> terminée et </a:t>
-            </a:r>
-            <a:r>
-              <a:rPr lang="fr-FR" sz="2000" dirty="0" err="1"/>
-              <a:t>fetch</a:t>
-            </a:r>
-            <a:r>
-              <a:rPr lang="fr-FR" sz="2000" dirty="0"/>
-              <a:t> du projet : GUICHETEAU </a:t>
-            </a:r>
-          </a:p>
-          <a:p>
-            <a:pPr marL="0" indent="0">
-              <a:buNone/>
-            </a:pPr>
-            <a:r>
-              <a:rPr lang="fr-FR" sz="2000" dirty="0"/>
-              <a:t>16/01/24</a:t>
+              <a:t>15/01/24-16/01/24</a:t>
             </a:r>
           </a:p>
           <a:p>

</xml_diff>